<commit_message>
Add session 3 video and update files.
</commit_message>
<xml_diff>
--- a/CPSC-24500/Week06/2017SpringW06Slides.pptx
+++ b/CPSC-24500/Week06/2017SpringW06Slides.pptx
@@ -5,7 +5,7 @@
     <p:sldMasterId id="2147483648" r:id="rId4"/>
   </p:sldMasterIdLst>
   <p:notesMasterIdLst>
-    <p:notesMasterId r:id="rId32"/>
+    <p:notesMasterId r:id="rId34"/>
   </p:notesMasterIdLst>
   <p:sldIdLst>
     <p:sldId id="381" r:id="rId5"/>
@@ -32,9 +32,11 @@
     <p:sldId id="517" r:id="rId26"/>
     <p:sldId id="475" r:id="rId27"/>
     <p:sldId id="514" r:id="rId28"/>
-    <p:sldId id="473" r:id="rId29"/>
-    <p:sldId id="497" r:id="rId30"/>
-    <p:sldId id="490" r:id="rId31"/>
+    <p:sldId id="518" r:id="rId29"/>
+    <p:sldId id="520" r:id="rId30"/>
+    <p:sldId id="521" r:id="rId31"/>
+    <p:sldId id="497" r:id="rId32"/>
+    <p:sldId id="490" r:id="rId33"/>
   </p:sldIdLst>
   <p:sldSz cx="12192000" cy="6858000"/>
   <p:notesSz cx="7315200" cy="9601200"/>
@@ -226,7 +228,7 @@
           <a:p>
             <a:fld id="{91ED72D7-FE6F-4B82-8D31-76BC00B06094}" type="datetimeFigureOut">
               <a:rPr lang="en-US" smtClean="0"/>
-              <a:t>4/25/2017</a:t>
+              <a:t>4/27/2017</a:t>
             </a:fld>
             <a:endParaRPr lang="en-US" dirty="0"/>
           </a:p>
@@ -2267,6 +2269,24 @@
           <a:bodyPr/>
           <a:lstStyle/>
           <a:p>
+            <a:r>
+              <a:rPr lang="en-US" sz="1000" dirty="0" err="1"/>
+              <a:t>FastPrimeLite</a:t>
+            </a:r>
+            <a:r>
+              <a:rPr lang="en-US" sz="1000" dirty="0"/>
+              <a:t>: I don’t want this week’s assignment to be difficult because of finding prime numbers and threading! This is intended to be an exercise in taking some things that we know like finding prime numbers and threading and becoming comfortable with implementing them in Visual Studio and C#. As such, my </a:t>
+            </a:r>
+            <a:r>
+              <a:rPr lang="en-US" sz="1000" dirty="0" err="1"/>
+              <a:t>FastPrimeLite</a:t>
+            </a:r>
+            <a:r>
+              <a:rPr lang="en-US" sz="1000" dirty="0"/>
+              <a:t> application that I am going to show today is going to be very much like what you will need to do from a logic perspective for this week’s assignment. You should feel free to copy (well type it in yourself, update the variable, and get the syntax correct) the code for you to become familiar with Visual Studio and C# editing, debugging, and updating. </a:t>
+            </a:r>
+          </a:p>
+          <a:p>
             <a:endParaRPr lang="en-US" sz="1000" dirty="0"/>
           </a:p>
         </p:txBody>
@@ -2354,33 +2374,7 @@
             <a:pPr marL="0" indent="0">
               <a:buNone/>
             </a:pPr>
-            <a:r>
-              <a:rPr lang="en-US" sz="1000" dirty="0"/>
-              <a:t>Application performance is  ALWAYS a challenge. Learn how to optimize, test, and enhance the performance regularly. It can’t be built in at the end of a project!</a:t>
-            </a:r>
-          </a:p>
-          <a:p>
-            <a:pPr marL="0" indent="0">
-              <a:buNone/>
-            </a:pPr>
             <a:endParaRPr lang="en-US" sz="1000" dirty="0"/>
-          </a:p>
-          <a:p>
-            <a:pPr marL="0" indent="0">
-              <a:buNone/>
-            </a:pPr>
-            <a:r>
-              <a:rPr lang="en-US" sz="1000" dirty="0"/>
-              <a:t>Given our experience with </a:t>
-            </a:r>
-            <a:r>
-              <a:rPr lang="en-US" sz="1000" dirty="0" err="1"/>
-              <a:t>ThreadedRandomNumbers</a:t>
-            </a:r>
-            <a:r>
-              <a:rPr lang="en-US" sz="1000" dirty="0"/>
-              <a:t> you may want to experiment with extending Thread vs. implementing Runnable?</a:t>
-            </a:r>
           </a:p>
         </p:txBody>
       </p:sp>
@@ -2410,7 +2404,7 @@
     </p:spTree>
     <p:extLst>
       <p:ext uri="{BB962C8B-B14F-4D97-AF65-F5344CB8AC3E}">
-        <p14:creationId xmlns:p14="http://schemas.microsoft.com/office/powerpoint/2010/main" val="3451647471"/>
+        <p14:creationId xmlns:p14="http://schemas.microsoft.com/office/powerpoint/2010/main" val="472950922"/>
       </p:ext>
     </p:extLst>
   </p:cSld>
@@ -2464,7 +2458,10 @@
           <a:bodyPr/>
           <a:lstStyle/>
           <a:p>
-            <a:endParaRPr lang="en-US" dirty="0"/>
+            <a:pPr marL="0" indent="0">
+              <a:buNone/>
+            </a:pPr>
+            <a:endParaRPr lang="en-US" sz="1000" dirty="0"/>
           </a:p>
         </p:txBody>
       </p:sp>
@@ -2494,7 +2491,7 @@
     </p:spTree>
     <p:extLst>
       <p:ext uri="{BB962C8B-B14F-4D97-AF65-F5344CB8AC3E}">
-        <p14:creationId xmlns:p14="http://schemas.microsoft.com/office/powerpoint/2010/main" val="4010604235"/>
+        <p14:creationId xmlns:p14="http://schemas.microsoft.com/office/powerpoint/2010/main" val="106941514"/>
       </p:ext>
     </p:extLst>
   </p:cSld>
@@ -2548,6 +2545,82 @@
           <a:bodyPr/>
           <a:lstStyle/>
           <a:p>
+            <a:pPr marL="0" indent="0">
+              <a:buNone/>
+            </a:pPr>
+            <a:r>
+              <a:rPr lang="en-US" sz="1000" dirty="0"/>
+              <a:t>I want you to be focused on learning the C# environment and syntax and not on </a:t>
+            </a:r>
+            <a:r>
+              <a:rPr lang="en-US" sz="1000" dirty="0" err="1"/>
+              <a:t>reimplenting</a:t>
+            </a:r>
+            <a:r>
+              <a:rPr lang="en-US" sz="1000" dirty="0"/>
+              <a:t> </a:t>
+            </a:r>
+            <a:r>
+              <a:rPr lang="en-US" sz="1000" dirty="0" err="1"/>
+              <a:t>FastPrime</a:t>
+            </a:r>
+            <a:r>
+              <a:rPr lang="en-US" sz="1000" dirty="0"/>
+              <a:t> to be better. </a:t>
+            </a:r>
+          </a:p>
+          <a:p>
+            <a:pPr marL="0" indent="0">
+              <a:buNone/>
+            </a:pPr>
+            <a:r>
+              <a:rPr lang="en-US" sz="1000" dirty="0"/>
+              <a:t>Your application should be your own; however, you’re welcome and encouraged to copy significant elements of </a:t>
+            </a:r>
+            <a:r>
+              <a:rPr lang="en-US" sz="1000" dirty="0" err="1"/>
+              <a:t>FastPrimeLite</a:t>
+            </a:r>
+            <a:r>
+              <a:rPr lang="en-US" sz="1000" dirty="0"/>
+              <a:t> in your assignment. You should type it in yourself, change the names of the classes and variables at a minimum, implement the missing features, use at least four threads, and generally enhance the implementation.</a:t>
+            </a:r>
+          </a:p>
+          <a:p>
+            <a:pPr marL="0" indent="0">
+              <a:buNone/>
+            </a:pPr>
+            <a:r>
+              <a:rPr lang="en-US" sz="1000" dirty="0"/>
+              <a:t>The crossed out items are items that will not be implemented if </a:t>
+            </a:r>
+            <a:r>
+              <a:rPr lang="en-US" sz="1000" dirty="0" err="1"/>
+              <a:t>FastPrimeLite</a:t>
+            </a:r>
+            <a:r>
+              <a:rPr lang="en-US" sz="1000" dirty="0"/>
+              <a:t> but that you will need to implement separately.</a:t>
+            </a:r>
+          </a:p>
+          <a:p>
+            <a:pPr marL="0" indent="0">
+              <a:buNone/>
+            </a:pPr>
+            <a:endParaRPr lang="en-US" sz="1000" dirty="0"/>
+          </a:p>
+          <a:p>
+            <a:pPr marL="0" indent="0">
+              <a:buNone/>
+            </a:pPr>
+            <a:r>
+              <a:rPr lang="en-US" sz="1000" dirty="0"/>
+              <a:t>Please don’t forget the easy things like your name at the top and start/end times, </a:t>
+            </a:r>
+            <a:r>
+              <a:rPr lang="en-US" sz="1000" dirty="0" err="1"/>
+              <a:t>etc</a:t>
+            </a:r>
             <a:endParaRPr lang="en-US" sz="1000" dirty="0"/>
           </a:p>
         </p:txBody>
@@ -2570,6 +2643,174 @@
             <a:fld id="{5394DE12-7B9B-46AA-AC19-C30A49928B9B}" type="slidenum">
               <a:rPr lang="en-US" smtClean="0"/>
               <a:t>27</a:t>
+            </a:fld>
+            <a:endParaRPr lang="en-US" dirty="0"/>
+          </a:p>
+        </p:txBody>
+      </p:sp>
+    </p:spTree>
+    <p:extLst>
+      <p:ext uri="{BB962C8B-B14F-4D97-AF65-F5344CB8AC3E}">
+        <p14:creationId xmlns:p14="http://schemas.microsoft.com/office/powerpoint/2010/main" val="394118486"/>
+      </p:ext>
+    </p:extLst>
+  </p:cSld>
+  <p:clrMapOvr>
+    <a:masterClrMapping/>
+  </p:clrMapOvr>
+</p:notes>
+</file>
+
+<file path=ppt/notesSlides/notesSlide28.xml><?xml version="1.0" encoding="utf-8"?>
+<p:notes xmlns:a="http://schemas.openxmlformats.org/drawingml/2006/main" xmlns:r="http://schemas.openxmlformats.org/officeDocument/2006/relationships" xmlns:p="http://schemas.openxmlformats.org/presentationml/2006/main">
+  <p:cSld>
+    <p:spTree>
+      <p:nvGrpSpPr>
+        <p:cNvPr id="1" name=""/>
+        <p:cNvGrpSpPr/>
+        <p:nvPr/>
+      </p:nvGrpSpPr>
+      <p:grpSpPr>
+        <a:xfrm>
+          <a:off x="0" y="0"/>
+          <a:ext cx="0" cy="0"/>
+          <a:chOff x="0" y="0"/>
+          <a:chExt cx="0" cy="0"/>
+        </a:xfrm>
+      </p:grpSpPr>
+      <p:sp>
+        <p:nvSpPr>
+          <p:cNvPr id="2" name="Slide Image Placeholder 1"/>
+          <p:cNvSpPr>
+            <a:spLocks noGrp="1" noRot="1" noChangeAspect="1"/>
+          </p:cNvSpPr>
+          <p:nvPr>
+            <p:ph type="sldImg"/>
+          </p:nvPr>
+        </p:nvSpPr>
+        <p:spPr/>
+      </p:sp>
+      <p:sp>
+        <p:nvSpPr>
+          <p:cNvPr id="3" name="Notes Placeholder 2"/>
+          <p:cNvSpPr>
+            <a:spLocks noGrp="1"/>
+          </p:cNvSpPr>
+          <p:nvPr>
+            <p:ph type="body" idx="1"/>
+          </p:nvPr>
+        </p:nvSpPr>
+        <p:spPr/>
+        <p:txBody>
+          <a:bodyPr/>
+          <a:lstStyle/>
+          <a:p>
+            <a:endParaRPr lang="en-US" dirty="0"/>
+          </a:p>
+        </p:txBody>
+      </p:sp>
+      <p:sp>
+        <p:nvSpPr>
+          <p:cNvPr id="4" name="Slide Number Placeholder 3"/>
+          <p:cNvSpPr>
+            <a:spLocks noGrp="1"/>
+          </p:cNvSpPr>
+          <p:nvPr>
+            <p:ph type="sldNum" sz="quarter" idx="10"/>
+          </p:nvPr>
+        </p:nvSpPr>
+        <p:spPr/>
+        <p:txBody>
+          <a:bodyPr/>
+          <a:lstStyle/>
+          <a:p>
+            <a:fld id="{5394DE12-7B9B-46AA-AC19-C30A49928B9B}" type="slidenum">
+              <a:rPr lang="en-US" smtClean="0"/>
+              <a:t>28</a:t>
+            </a:fld>
+            <a:endParaRPr lang="en-US" dirty="0"/>
+          </a:p>
+        </p:txBody>
+      </p:sp>
+    </p:spTree>
+    <p:extLst>
+      <p:ext uri="{BB962C8B-B14F-4D97-AF65-F5344CB8AC3E}">
+        <p14:creationId xmlns:p14="http://schemas.microsoft.com/office/powerpoint/2010/main" val="4010604235"/>
+      </p:ext>
+    </p:extLst>
+  </p:cSld>
+  <p:clrMapOvr>
+    <a:masterClrMapping/>
+  </p:clrMapOvr>
+</p:notes>
+</file>
+
+<file path=ppt/notesSlides/notesSlide29.xml><?xml version="1.0" encoding="utf-8"?>
+<p:notes xmlns:a="http://schemas.openxmlformats.org/drawingml/2006/main" xmlns:r="http://schemas.openxmlformats.org/officeDocument/2006/relationships" xmlns:p="http://schemas.openxmlformats.org/presentationml/2006/main">
+  <p:cSld>
+    <p:spTree>
+      <p:nvGrpSpPr>
+        <p:cNvPr id="1" name=""/>
+        <p:cNvGrpSpPr/>
+        <p:nvPr/>
+      </p:nvGrpSpPr>
+      <p:grpSpPr>
+        <a:xfrm>
+          <a:off x="0" y="0"/>
+          <a:ext cx="0" cy="0"/>
+          <a:chOff x="0" y="0"/>
+          <a:chExt cx="0" cy="0"/>
+        </a:xfrm>
+      </p:grpSpPr>
+      <p:sp>
+        <p:nvSpPr>
+          <p:cNvPr id="2" name="Slide Image Placeholder 1"/>
+          <p:cNvSpPr>
+            <a:spLocks noGrp="1" noRot="1" noChangeAspect="1"/>
+          </p:cNvSpPr>
+          <p:nvPr>
+            <p:ph type="sldImg"/>
+          </p:nvPr>
+        </p:nvSpPr>
+        <p:spPr/>
+      </p:sp>
+      <p:sp>
+        <p:nvSpPr>
+          <p:cNvPr id="3" name="Notes Placeholder 2"/>
+          <p:cNvSpPr>
+            <a:spLocks noGrp="1"/>
+          </p:cNvSpPr>
+          <p:nvPr>
+            <p:ph type="body" idx="1"/>
+          </p:nvPr>
+        </p:nvSpPr>
+        <p:spPr/>
+        <p:txBody>
+          <a:bodyPr/>
+          <a:lstStyle/>
+          <a:p>
+            <a:endParaRPr lang="en-US" sz="1000" dirty="0"/>
+          </a:p>
+        </p:txBody>
+      </p:sp>
+      <p:sp>
+        <p:nvSpPr>
+          <p:cNvPr id="4" name="Slide Number Placeholder 3"/>
+          <p:cNvSpPr>
+            <a:spLocks noGrp="1"/>
+          </p:cNvSpPr>
+          <p:nvPr>
+            <p:ph type="sldNum" sz="quarter" idx="10"/>
+          </p:nvPr>
+        </p:nvSpPr>
+        <p:spPr/>
+        <p:txBody>
+          <a:bodyPr/>
+          <a:lstStyle/>
+          <a:p>
+            <a:fld id="{5394DE12-7B9B-46AA-AC19-C30A49928B9B}" type="slidenum">
+              <a:rPr lang="en-US" smtClean="0"/>
+              <a:t>29</a:t>
             </a:fld>
             <a:endParaRPr lang="en-US" dirty="0"/>
           </a:p>
@@ -3344,7 +3585,7 @@
           <a:p>
             <a:fld id="{969F32F5-AB1C-41B2-AE79-C9DE1D1745A4}" type="datetimeFigureOut">
               <a:rPr lang="en-US" smtClean="0"/>
-              <a:t>4/25/2017</a:t>
+              <a:t>4/27/2017</a:t>
             </a:fld>
             <a:endParaRPr lang="en-US" dirty="0"/>
           </a:p>
@@ -3512,7 +3753,7 @@
           <a:p>
             <a:fld id="{969F32F5-AB1C-41B2-AE79-C9DE1D1745A4}" type="datetimeFigureOut">
               <a:rPr lang="en-US" smtClean="0"/>
-              <a:t>4/25/2017</a:t>
+              <a:t>4/27/2017</a:t>
             </a:fld>
             <a:endParaRPr lang="en-US" dirty="0"/>
           </a:p>
@@ -3690,7 +3931,7 @@
           <a:p>
             <a:fld id="{969F32F5-AB1C-41B2-AE79-C9DE1D1745A4}" type="datetimeFigureOut">
               <a:rPr lang="en-US" smtClean="0"/>
-              <a:t>4/25/2017</a:t>
+              <a:t>4/27/2017</a:t>
             </a:fld>
             <a:endParaRPr lang="en-US" dirty="0"/>
           </a:p>
@@ -3858,7 +4099,7 @@
           <a:p>
             <a:fld id="{969F32F5-AB1C-41B2-AE79-C9DE1D1745A4}" type="datetimeFigureOut">
               <a:rPr lang="en-US" smtClean="0"/>
-              <a:t>4/25/2017</a:t>
+              <a:t>4/27/2017</a:t>
             </a:fld>
             <a:endParaRPr lang="en-US" dirty="0"/>
           </a:p>
@@ -4103,7 +4344,7 @@
           <a:p>
             <a:fld id="{969F32F5-AB1C-41B2-AE79-C9DE1D1745A4}" type="datetimeFigureOut">
               <a:rPr lang="en-US" smtClean="0"/>
-              <a:t>4/25/2017</a:t>
+              <a:t>4/27/2017</a:t>
             </a:fld>
             <a:endParaRPr lang="en-US" dirty="0"/>
           </a:p>
@@ -4332,7 +4573,7 @@
           <a:p>
             <a:fld id="{969F32F5-AB1C-41B2-AE79-C9DE1D1745A4}" type="datetimeFigureOut">
               <a:rPr lang="en-US" smtClean="0"/>
-              <a:t>4/25/2017</a:t>
+              <a:t>4/27/2017</a:t>
             </a:fld>
             <a:endParaRPr lang="en-US" dirty="0"/>
           </a:p>
@@ -4696,7 +4937,7 @@
           <a:p>
             <a:fld id="{969F32F5-AB1C-41B2-AE79-C9DE1D1745A4}" type="datetimeFigureOut">
               <a:rPr lang="en-US" smtClean="0"/>
-              <a:t>4/25/2017</a:t>
+              <a:t>4/27/2017</a:t>
             </a:fld>
             <a:endParaRPr lang="en-US" dirty="0"/>
           </a:p>
@@ -4813,7 +5054,7 @@
           <a:p>
             <a:fld id="{969F32F5-AB1C-41B2-AE79-C9DE1D1745A4}" type="datetimeFigureOut">
               <a:rPr lang="en-US" smtClean="0"/>
-              <a:t>4/25/2017</a:t>
+              <a:t>4/27/2017</a:t>
             </a:fld>
             <a:endParaRPr lang="en-US" dirty="0"/>
           </a:p>
@@ -4908,7 +5149,7 @@
           <a:p>
             <a:fld id="{969F32F5-AB1C-41B2-AE79-C9DE1D1745A4}" type="datetimeFigureOut">
               <a:rPr lang="en-US" smtClean="0"/>
-              <a:t>4/25/2017</a:t>
+              <a:t>4/27/2017</a:t>
             </a:fld>
             <a:endParaRPr lang="en-US" dirty="0"/>
           </a:p>
@@ -5183,7 +5424,7 @@
           <a:p>
             <a:fld id="{969F32F5-AB1C-41B2-AE79-C9DE1D1745A4}" type="datetimeFigureOut">
               <a:rPr lang="en-US" smtClean="0"/>
-              <a:t>4/25/2017</a:t>
+              <a:t>4/27/2017</a:t>
             </a:fld>
             <a:endParaRPr lang="en-US" dirty="0"/>
           </a:p>
@@ -5435,7 +5676,7 @@
           <a:p>
             <a:fld id="{969F32F5-AB1C-41B2-AE79-C9DE1D1745A4}" type="datetimeFigureOut">
               <a:rPr lang="en-US" smtClean="0"/>
-              <a:t>4/25/2017</a:t>
+              <a:t>4/27/2017</a:t>
             </a:fld>
             <a:endParaRPr lang="en-US" dirty="0"/>
           </a:p>
@@ -5646,7 +5887,7 @@
           <a:p>
             <a:fld id="{969F32F5-AB1C-41B2-AE79-C9DE1D1745A4}" type="datetimeFigureOut">
               <a:rPr lang="en-US" smtClean="0"/>
-              <a:t>4/25/2017</a:t>
+              <a:t>4/27/2017</a:t>
             </a:fld>
             <a:endParaRPr lang="en-US" dirty="0"/>
           </a:p>
@@ -8167,7 +8408,7 @@
             </a:br>
             <a:r>
               <a:rPr lang="en-US" sz="1800" dirty="0"/>
-              <a:t>Session: Week 6 Session 3 Preview</a:t>
+              <a:t>Session: Week 6 Session 2 Plus</a:t>
             </a:r>
             <a:br>
               <a:rPr lang="en-US" sz="1800" dirty="0"/>
@@ -9327,7 +9568,7 @@
             </a:r>
             <a:r>
               <a:rPr lang="en-US" sz="2000" dirty="0"/>
-              <a:t>  </a:t>
+              <a:t> </a:t>
             </a:r>
             <a:r>
               <a:rPr lang="en-US" sz="2000" dirty="0">
@@ -9533,7 +9774,7 @@
             </a:br>
             <a:r>
               <a:rPr lang="en-US" sz="1800" dirty="0"/>
-              <a:t>Session: Week 6 Session 3</a:t>
+              <a:t>Session: Week 6 Session 3 (Lunch &amp; Learn)</a:t>
             </a:r>
             <a:br>
               <a:rPr lang="en-US" sz="1800" dirty="0"/>
@@ -9572,7 +9813,7 @@
       </p:pic>
       <p:sp>
         <p:nvSpPr>
-          <p:cNvPr id="6" name="Content Placeholder 5"/>
+          <p:cNvPr id="8" name="Content Placeholder 2"/>
           <p:cNvSpPr>
             <a:spLocks noGrp="1"/>
           </p:cNvSpPr>
@@ -9580,26 +9821,42 @@
             <p:ph idx="1"/>
           </p:nvPr>
         </p:nvSpPr>
-        <p:spPr/>
+        <p:spPr>
+          <a:xfrm>
+            <a:off x="838200" y="1795301"/>
+            <a:ext cx="10718950" cy="4571242"/>
+          </a:xfrm>
+        </p:spPr>
         <p:txBody>
           <a:bodyPr>
-            <a:normAutofit/>
+            <a:noAutofit/>
           </a:bodyPr>
           <a:lstStyle/>
+          <a:p>
+            <a:pPr marL="0" indent="0">
+              <a:buNone/>
+            </a:pPr>
+            <a:r>
+              <a:rPr lang="en-US" sz="2000" u="sng" dirty="0"/>
+              <a:t>Agenda:</a:t>
+            </a:r>
+          </a:p>
           <a:p>
             <a:pPr marL="457200" indent="-457200">
               <a:buFont typeface="+mj-lt"/>
               <a:buAutoNum type="arabicPeriod"/>
             </a:pPr>
             <a:r>
-              <a:rPr lang="en-US" sz="2000" dirty="0">
-                <a:solidFill>
-                  <a:schemeClr val="bg1">
-                    <a:lumMod val="65000"/>
-                  </a:schemeClr>
-                </a:solidFill>
-              </a:rPr>
-              <a:t>Download and install Visual Studio... And implement Hello World in C#</a:t>
+              <a:rPr lang="en-US" sz="2000" dirty="0"/>
+              <a:t>Review </a:t>
+            </a:r>
+            <a:r>
+              <a:rPr lang="en-US" sz="2000" dirty="0" err="1"/>
+              <a:t>FastPrime</a:t>
+            </a:r>
+            <a:r>
+              <a:rPr lang="en-US" sz="2000" dirty="0"/>
+              <a:t> C# Assignment</a:t>
             </a:r>
           </a:p>
           <a:p>
@@ -9608,127 +9865,9 @@
               <a:buAutoNum type="arabicPeriod"/>
             </a:pPr>
             <a:r>
-              <a:rPr lang="en-US" sz="2000" dirty="0">
-                <a:solidFill>
-                  <a:schemeClr val="bg1">
-                    <a:lumMod val="65000"/>
-                  </a:schemeClr>
-                </a:solidFill>
-              </a:rPr>
-              <a:t>Identify characteristics of Java, Python, and C#</a:t>
-            </a:r>
-          </a:p>
-          <a:p>
-            <a:pPr marL="457200" indent="-457200">
-              <a:buFont typeface="+mj-lt"/>
-              <a:buAutoNum type="arabicPeriod"/>
-            </a:pPr>
-            <a:r>
-              <a:rPr lang="en-US" sz="2000" dirty="0">
-                <a:solidFill>
-                  <a:schemeClr val="bg1">
-                    <a:lumMod val="65000"/>
-                  </a:schemeClr>
-                </a:solidFill>
-              </a:rPr>
-              <a:t>Professional positioning </a:t>
-            </a:r>
-          </a:p>
-          <a:p>
-            <a:pPr marL="457200" indent="-457200">
-              <a:buFont typeface="+mj-lt"/>
-              <a:buAutoNum type="arabicPeriod"/>
-            </a:pPr>
-            <a:r>
-              <a:rPr lang="en-US" sz="2000" strike="sngStrike" dirty="0">
-                <a:solidFill>
-                  <a:schemeClr val="bg1">
-                    <a:lumMod val="65000"/>
-                  </a:schemeClr>
-                </a:solidFill>
-              </a:rPr>
-              <a:t>Write non-object-oriented programs that use sequence, selection, and repetition </a:t>
-            </a:r>
-          </a:p>
-          <a:p>
-            <a:pPr marL="457200" indent="-457200">
-              <a:buFont typeface="+mj-lt"/>
-              <a:buAutoNum type="arabicPeriod"/>
-            </a:pPr>
-            <a:r>
-              <a:rPr lang="en-US" sz="2000" dirty="0">
-                <a:solidFill>
-                  <a:schemeClr val="bg1">
-                    <a:lumMod val="65000"/>
-                  </a:schemeClr>
-                </a:solidFill>
-              </a:rPr>
-              <a:t>Use Visual Studio 2017 to define C# classes, complete with properties, methods, and constructors… and much more</a:t>
-            </a:r>
-          </a:p>
-          <a:p>
-            <a:pPr marL="457200" indent="-457200">
-              <a:buFont typeface="+mj-lt"/>
-              <a:buAutoNum type="arabicPeriod"/>
-            </a:pPr>
-            <a:r>
-              <a:rPr lang="en-US" sz="2000" dirty="0">
-                <a:solidFill>
-                  <a:schemeClr val="bg1">
-                    <a:lumMod val="65000"/>
-                  </a:schemeClr>
-                </a:solidFill>
-              </a:rPr>
-              <a:t>Create classes and objects to carry out the work of your program</a:t>
-            </a:r>
-          </a:p>
-          <a:p>
-            <a:pPr marL="457200" indent="-457200">
-              <a:buFont typeface="+mj-lt"/>
-              <a:buAutoNum type="arabicPeriod"/>
-            </a:pPr>
-            <a:r>
-              <a:rPr lang="en-US" sz="2000" dirty="0">
-                <a:solidFill>
-                  <a:schemeClr val="bg1">
-                    <a:lumMod val="65000"/>
-                  </a:schemeClr>
-                </a:solidFill>
-              </a:rPr>
-              <a:t>Use inheritance to create a hierarchy of classes that are related to each other</a:t>
-            </a:r>
-          </a:p>
-          <a:p>
-            <a:pPr marL="457200" indent="-457200">
-              <a:buFont typeface="+mj-lt"/>
-              <a:buAutoNum type="arabicPeriod"/>
-            </a:pPr>
-            <a:r>
-              <a:rPr lang="en-US" sz="2000" dirty="0"/>
-              <a:t>Use .NET (C#) text file objects to create and read text files</a:t>
-            </a:r>
-          </a:p>
-          <a:p>
-            <a:pPr marL="457200" indent="-457200">
-              <a:buFont typeface="+mj-lt"/>
-              <a:buAutoNum type="arabicPeriod"/>
-            </a:pPr>
-            <a:r>
-              <a:rPr lang="en-US" sz="2000" dirty="0"/>
-              <a:t>Work with .NET (C#) lists</a:t>
-            </a:r>
-          </a:p>
-          <a:p>
-            <a:pPr marL="457200" indent="-457200">
-              <a:buFont typeface="+mj-lt"/>
-              <a:buAutoNum type="arabicPeriod"/>
-            </a:pPr>
-            <a:r>
-              <a:rPr lang="en-US" sz="2000" dirty="0"/>
-              <a:t>Deal with a list of related objects polymorphically</a:t>
-            </a:r>
-          </a:p>
-          <a:p>
+              <a:rPr lang="en-US" sz="2000" dirty="0" err="1"/>
+              <a:t>FastPrimeLite</a:t>
+            </a:r>
             <a:endParaRPr lang="en-US" sz="2000" dirty="0"/>
           </a:p>
         </p:txBody>
@@ -9791,127 +9930,39 @@
             </a:r>
             <a:r>
               <a:rPr lang="en-US" sz="3600" dirty="0"/>
-              <a:t>… plus Questions</a:t>
-            </a:r>
-          </a:p>
-        </p:txBody>
-      </p:sp>
-      <p:sp>
-        <p:nvSpPr>
-          <p:cNvPr id="3" name="Content Placeholder 2"/>
-          <p:cNvSpPr>
-            <a:spLocks noGrp="1"/>
-          </p:cNvSpPr>
-          <p:nvPr>
-            <p:ph idx="1"/>
-          </p:nvPr>
-        </p:nvSpPr>
+              <a:t> C#</a:t>
+            </a:r>
+          </a:p>
+        </p:txBody>
+      </p:sp>
+      <p:pic>
+        <p:nvPicPr>
+          <p:cNvPr id="6" name="Picture 5"/>
+          <p:cNvPicPr>
+            <a:picLocks noChangeAspect="1"/>
+          </p:cNvPicPr>
+          <p:nvPr/>
+        </p:nvPicPr>
+        <p:blipFill>
+          <a:blip r:embed="rId3"/>
+          <a:stretch>
+            <a:fillRect/>
+          </a:stretch>
+        </p:blipFill>
         <p:spPr>
           <a:xfrm>
-            <a:off x="838199" y="1549178"/>
-            <a:ext cx="10453578" cy="4783519"/>
+            <a:off x="1073889" y="1604179"/>
+            <a:ext cx="9601200" cy="4900223"/>
           </a:xfrm>
+          <a:prstGeom prst="rect">
+            <a:avLst/>
+          </a:prstGeom>
         </p:spPr>
-        <p:txBody>
-          <a:bodyPr>
-            <a:normAutofit/>
-          </a:bodyPr>
-          <a:lstStyle/>
-          <a:p>
-            <a:pPr marL="0" indent="0">
-              <a:buNone/>
-            </a:pPr>
-            <a:r>
-              <a:rPr lang="en-US" sz="2000" dirty="0"/>
-              <a:t>Write a performance optimized command line Java application that will programmatically find prime numbers [link] and store those numbers sorted in an output file. </a:t>
-            </a:r>
-          </a:p>
-          <a:p>
-            <a:pPr marL="0" indent="0">
-              <a:buNone/>
-            </a:pPr>
-            <a:r>
-              <a:rPr lang="en-US" sz="2000" dirty="0"/>
-              <a:t>In </a:t>
-            </a:r>
-            <a:r>
-              <a:rPr lang="en-US" sz="2000" dirty="0" err="1"/>
-              <a:t>FastPrime</a:t>
-            </a:r>
-            <a:r>
-              <a:rPr lang="en-US" sz="2000" dirty="0"/>
-              <a:t> we will create a command line Java application that will:</a:t>
-            </a:r>
-          </a:p>
-          <a:p>
-            <a:pPr marL="457200" indent="-457200">
-              <a:buFont typeface="+mj-lt"/>
-              <a:buAutoNum type="arabicPeriod"/>
-            </a:pPr>
-            <a:r>
-              <a:rPr lang="en-US" sz="2000" dirty="0"/>
-              <a:t>Use multiple threads to find the prime numbers between two numbers</a:t>
-            </a:r>
-          </a:p>
-          <a:p>
-            <a:pPr marL="457200" indent="-457200">
-              <a:buFont typeface="+mj-lt"/>
-              <a:buAutoNum type="arabicPeriod"/>
-            </a:pPr>
-            <a:r>
-              <a:rPr lang="en-US" sz="2000" dirty="0"/>
-              <a:t>Sort those results and store them to a file</a:t>
-            </a:r>
-          </a:p>
-          <a:p>
-            <a:pPr marL="457200" indent="-457200">
-              <a:buFont typeface="+mj-lt"/>
-              <a:buAutoNum type="arabicPeriod"/>
-            </a:pPr>
-            <a:r>
-              <a:rPr lang="en-US" sz="2000" dirty="0"/>
-              <a:t>Perform some timings</a:t>
-            </a:r>
-          </a:p>
-          <a:p>
-            <a:pPr marL="457200" indent="-457200">
-              <a:buFont typeface="+mj-lt"/>
-              <a:buAutoNum type="arabicPeriod"/>
-            </a:pPr>
-            <a:r>
-              <a:rPr lang="en-US" sz="2000" dirty="0"/>
-              <a:t>… And do this all </a:t>
-            </a:r>
-            <a:r>
-              <a:rPr lang="en-US" sz="2000" u="sng" dirty="0"/>
-              <a:t>very</a:t>
-            </a:r>
-            <a:r>
-              <a:rPr lang="en-US" sz="2000" dirty="0"/>
-              <a:t> fast</a:t>
-            </a:r>
-          </a:p>
-          <a:p>
-            <a:pPr marL="0" indent="0">
-              <a:buNone/>
-            </a:pPr>
-            <a:endParaRPr lang="en-US" sz="2000" dirty="0"/>
-          </a:p>
-          <a:p>
-            <a:pPr marL="0" indent="0">
-              <a:buNone/>
-            </a:pPr>
-            <a:r>
-              <a:rPr lang="en-US" sz="2000" dirty="0"/>
-              <a:t>See the details in this week’s assignment</a:t>
-            </a:r>
-          </a:p>
-        </p:txBody>
-      </p:sp>
+      </p:pic>
     </p:spTree>
     <p:extLst>
       <p:ext uri="{BB962C8B-B14F-4D97-AF65-F5344CB8AC3E}">
-        <p14:creationId xmlns:p14="http://schemas.microsoft.com/office/powerpoint/2010/main" val="1093881097"/>
+        <p14:creationId xmlns:p14="http://schemas.microsoft.com/office/powerpoint/2010/main" val="1179229604"/>
       </p:ext>
     </p:extLst>
   </p:cSld>
@@ -9922,6 +9973,311 @@
 </file>
 
 <file path=ppt/slides/slide26.xml><?xml version="1.0" encoding="utf-8"?>
+<p:sld xmlns:a="http://schemas.openxmlformats.org/drawingml/2006/main" xmlns:r="http://schemas.openxmlformats.org/officeDocument/2006/relationships" xmlns:p="http://schemas.openxmlformats.org/presentationml/2006/main">
+  <p:cSld>
+    <p:spTree>
+      <p:nvGrpSpPr>
+        <p:cNvPr id="1" name=""/>
+        <p:cNvGrpSpPr/>
+        <p:nvPr/>
+      </p:nvGrpSpPr>
+      <p:grpSpPr>
+        <a:xfrm>
+          <a:off x="0" y="0"/>
+          <a:ext cx="0" cy="0"/>
+          <a:chOff x="0" y="0"/>
+          <a:chExt cx="0" cy="0"/>
+        </a:xfrm>
+      </p:grpSpPr>
+      <p:sp>
+        <p:nvSpPr>
+          <p:cNvPr id="2" name="Title 1"/>
+          <p:cNvSpPr>
+            <a:spLocks noGrp="1"/>
+          </p:cNvSpPr>
+          <p:nvPr>
+            <p:ph type="title"/>
+          </p:nvPr>
+        </p:nvSpPr>
+        <p:spPr>
+          <a:xfrm>
+            <a:off x="838200" y="365125"/>
+            <a:ext cx="10411047" cy="1325563"/>
+          </a:xfrm>
+        </p:spPr>
+        <p:txBody>
+          <a:bodyPr>
+            <a:normAutofit/>
+          </a:bodyPr>
+          <a:lstStyle/>
+          <a:p>
+            <a:r>
+              <a:rPr lang="en-US" sz="3600" dirty="0" err="1"/>
+              <a:t>FastPrime</a:t>
+            </a:r>
+            <a:r>
+              <a:rPr lang="en-US" sz="3600" dirty="0"/>
+              <a:t> C# (continued)</a:t>
+            </a:r>
+          </a:p>
+        </p:txBody>
+      </p:sp>
+      <p:pic>
+        <p:nvPicPr>
+          <p:cNvPr id="3" name="Picture 2"/>
+          <p:cNvPicPr>
+            <a:picLocks noChangeAspect="1"/>
+          </p:cNvPicPr>
+          <p:nvPr/>
+        </p:nvPicPr>
+        <p:blipFill>
+          <a:blip r:embed="rId3"/>
+          <a:stretch>
+            <a:fillRect/>
+          </a:stretch>
+        </p:blipFill>
+        <p:spPr>
+          <a:xfrm>
+            <a:off x="1073889" y="1690688"/>
+            <a:ext cx="9532743" cy="2721824"/>
+          </a:xfrm>
+          <a:prstGeom prst="rect">
+            <a:avLst/>
+          </a:prstGeom>
+        </p:spPr>
+      </p:pic>
+    </p:spTree>
+    <p:extLst>
+      <p:ext uri="{BB962C8B-B14F-4D97-AF65-F5344CB8AC3E}">
+        <p14:creationId xmlns:p14="http://schemas.microsoft.com/office/powerpoint/2010/main" val="786509951"/>
+      </p:ext>
+    </p:extLst>
+  </p:cSld>
+  <p:clrMapOvr>
+    <a:masterClrMapping/>
+  </p:clrMapOvr>
+</p:sld>
+</file>
+
+<file path=ppt/slides/slide27.xml><?xml version="1.0" encoding="utf-8"?>
+<p:sld xmlns:a="http://schemas.openxmlformats.org/drawingml/2006/main" xmlns:r="http://schemas.openxmlformats.org/officeDocument/2006/relationships" xmlns:p="http://schemas.openxmlformats.org/presentationml/2006/main">
+  <p:cSld>
+    <p:spTree>
+      <p:nvGrpSpPr>
+        <p:cNvPr id="1" name=""/>
+        <p:cNvGrpSpPr/>
+        <p:nvPr/>
+      </p:nvGrpSpPr>
+      <p:grpSpPr>
+        <a:xfrm>
+          <a:off x="0" y="0"/>
+          <a:ext cx="0" cy="0"/>
+          <a:chOff x="0" y="0"/>
+          <a:chExt cx="0" cy="0"/>
+        </a:xfrm>
+      </p:grpSpPr>
+      <p:sp>
+        <p:nvSpPr>
+          <p:cNvPr id="2" name="Title 1"/>
+          <p:cNvSpPr>
+            <a:spLocks noGrp="1"/>
+          </p:cNvSpPr>
+          <p:nvPr>
+            <p:ph type="title"/>
+          </p:nvPr>
+        </p:nvSpPr>
+        <p:spPr>
+          <a:xfrm>
+            <a:off x="838200" y="365125"/>
+            <a:ext cx="10411047" cy="1325563"/>
+          </a:xfrm>
+        </p:spPr>
+        <p:txBody>
+          <a:bodyPr>
+            <a:normAutofit/>
+          </a:bodyPr>
+          <a:lstStyle/>
+          <a:p>
+            <a:r>
+              <a:rPr lang="en-US" sz="3600" dirty="0" err="1"/>
+              <a:t>FastPrimeLite</a:t>
+            </a:r>
+            <a:endParaRPr lang="en-US" sz="3600" dirty="0"/>
+          </a:p>
+        </p:txBody>
+      </p:sp>
+      <p:sp>
+        <p:nvSpPr>
+          <p:cNvPr id="4" name="Content Placeholder 2"/>
+          <p:cNvSpPr>
+            <a:spLocks noGrp="1"/>
+          </p:cNvSpPr>
+          <p:nvPr>
+            <p:ph idx="1"/>
+          </p:nvPr>
+        </p:nvSpPr>
+        <p:spPr>
+          <a:xfrm>
+            <a:off x="838200" y="1481640"/>
+            <a:ext cx="10718950" cy="5062699"/>
+          </a:xfrm>
+        </p:spPr>
+        <p:txBody>
+          <a:bodyPr>
+            <a:noAutofit/>
+          </a:bodyPr>
+          <a:lstStyle/>
+          <a:p>
+            <a:pPr marL="0" indent="0">
+              <a:buNone/>
+            </a:pPr>
+            <a:r>
+              <a:rPr lang="en-US" sz="2000" u="sng" dirty="0"/>
+              <a:t>Features:</a:t>
+            </a:r>
+          </a:p>
+          <a:p>
+            <a:pPr marL="457200" indent="-457200">
+              <a:buFont typeface="+mj-lt"/>
+              <a:buAutoNum type="arabicPeriod"/>
+            </a:pPr>
+            <a:r>
+              <a:rPr lang="en-US" sz="2000" dirty="0"/>
+              <a:t>Develop  application entirely in Visual Studio 2017 and C#</a:t>
+            </a:r>
+          </a:p>
+          <a:p>
+            <a:pPr marL="457200" indent="-457200">
+              <a:buFont typeface="+mj-lt"/>
+              <a:buAutoNum type="arabicPeriod"/>
+            </a:pPr>
+            <a:r>
+              <a:rPr lang="en-US" sz="2000" dirty="0"/>
+              <a:t>Take in two command line arguments that represent the start and end number </a:t>
+            </a:r>
+          </a:p>
+          <a:p>
+            <a:pPr marL="457200" indent="-457200">
+              <a:buFont typeface="+mj-lt"/>
+              <a:buAutoNum type="arabicPeriod"/>
+            </a:pPr>
+            <a:r>
+              <a:rPr lang="en-US" sz="2000" strike="sngStrike" dirty="0"/>
+              <a:t>Fail gracefully with a meaningful error message if inappropriate arguments are passed in </a:t>
+            </a:r>
+          </a:p>
+          <a:p>
+            <a:pPr marL="457200" indent="-457200">
+              <a:buFont typeface="+mj-lt"/>
+              <a:buAutoNum type="arabicPeriod"/>
+            </a:pPr>
+            <a:r>
+              <a:rPr lang="en-US" sz="2000" dirty="0"/>
+              <a:t>Find the prime numbers in the range</a:t>
+            </a:r>
+          </a:p>
+          <a:p>
+            <a:pPr marL="457200" indent="-457200">
+              <a:buFont typeface="+mj-lt"/>
+              <a:buAutoNum type="arabicPeriod"/>
+            </a:pPr>
+            <a:r>
+              <a:rPr lang="en-US" sz="2000" dirty="0"/>
+              <a:t>Add numbers to a list</a:t>
+            </a:r>
+          </a:p>
+          <a:p>
+            <a:pPr marL="457200" indent="-457200">
+              <a:buFont typeface="+mj-lt"/>
+              <a:buAutoNum type="arabicPeriod"/>
+            </a:pPr>
+            <a:r>
+              <a:rPr lang="en-US" sz="2000" dirty="0"/>
+              <a:t>Sort the list</a:t>
+            </a:r>
+          </a:p>
+          <a:p>
+            <a:pPr marL="457200" indent="-457200">
+              <a:buFont typeface="+mj-lt"/>
+              <a:buAutoNum type="arabicPeriod"/>
+            </a:pPr>
+            <a:r>
+              <a:rPr lang="en-US" sz="2000" dirty="0"/>
+              <a:t>Use multiple threads… I will use 3 and you should use at least 4</a:t>
+            </a:r>
+          </a:p>
+          <a:p>
+            <a:pPr marL="457200" indent="-457200">
+              <a:buFont typeface="+mj-lt"/>
+              <a:buAutoNum type="arabicPeriod"/>
+            </a:pPr>
+            <a:r>
+              <a:rPr lang="en-US" sz="2000" dirty="0"/>
+              <a:t>Each prime number should be printed to the console window </a:t>
+            </a:r>
+          </a:p>
+          <a:p>
+            <a:pPr marL="457200" indent="-457200">
+              <a:buFont typeface="+mj-lt"/>
+              <a:buAutoNum type="arabicPeriod"/>
+            </a:pPr>
+            <a:r>
+              <a:rPr lang="en-US" sz="2000" dirty="0"/>
+              <a:t>Write to the  console (1) the number of prime number found (and stored in the file), </a:t>
+            </a:r>
+            <a:r>
+              <a:rPr lang="en-US" sz="2000" strike="sngStrike" dirty="0"/>
+              <a:t>(2) the start time, (3) the finish time,</a:t>
+            </a:r>
+            <a:r>
+              <a:rPr lang="en-US" sz="2000" dirty="0"/>
+              <a:t> and (4) elapsed time</a:t>
+            </a:r>
+          </a:p>
+          <a:p>
+            <a:pPr marL="457200" indent="-457200">
+              <a:buFont typeface="+mj-lt"/>
+              <a:buAutoNum type="arabicPeriod"/>
+            </a:pPr>
+            <a:r>
+              <a:rPr lang="en-US" sz="2000" dirty="0"/>
+              <a:t>Output results to text file called FastPrimeLite.txt </a:t>
+            </a:r>
+          </a:p>
+          <a:p>
+            <a:pPr marL="457200" indent="-457200">
+              <a:buFont typeface="+mj-lt"/>
+              <a:buAutoNum type="arabicPeriod"/>
+            </a:pPr>
+            <a:r>
+              <a:rPr lang="en-US" sz="2000" dirty="0"/>
+              <a:t>Review the location of </a:t>
+            </a:r>
+            <a:r>
+              <a:rPr lang="en-US" sz="2000" dirty="0" err="1"/>
+              <a:t>Program.cs</a:t>
+            </a:r>
+            <a:r>
+              <a:rPr lang="en-US" sz="2000" dirty="0"/>
+              <a:t> and the release executable named “FastPrimeLite.exe</a:t>
+            </a:r>
+          </a:p>
+        </p:txBody>
+      </p:sp>
+    </p:spTree>
+    <p:extLst>
+      <p:ext uri="{BB962C8B-B14F-4D97-AF65-F5344CB8AC3E}">
+        <p14:creationId xmlns:p14="http://schemas.microsoft.com/office/powerpoint/2010/main" val="1699693233"/>
+      </p:ext>
+    </p:extLst>
+  </p:cSld>
+  <p:clrMapOvr>
+    <a:masterClrMapping/>
+  </p:clrMapOvr>
+</p:sld>
+</file>
+
+<file path=ppt/slides/slide28.xml><?xml version="1.0" encoding="utf-8"?>
 <p:sld xmlns:a="http://schemas.openxmlformats.org/drawingml/2006/main" xmlns:r="http://schemas.openxmlformats.org/officeDocument/2006/relationships" xmlns:p="http://schemas.openxmlformats.org/presentationml/2006/main">
   <p:cSld>
     <p:bg>
@@ -10041,7 +10397,7 @@
 </p:sld>
 </file>
 
-<file path=ppt/slides/slide27.xml><?xml version="1.0" encoding="utf-8"?>
+<file path=ppt/slides/slide29.xml><?xml version="1.0" encoding="utf-8"?>
 <p:sld xmlns:a="http://schemas.openxmlformats.org/drawingml/2006/main" xmlns:r="http://schemas.openxmlformats.org/officeDocument/2006/relationships" xmlns:p="http://schemas.openxmlformats.org/presentationml/2006/main">
   <p:cSld>
     <p:bg>
@@ -12068,12 +12424,9 @@
 </file>
 
 <file path=customXml/item1.xml><?xml version="1.0" encoding="utf-8"?>
-<?mso-contentType ?>
-<FormTemplates xmlns="http://schemas.microsoft.com/sharepoint/v3/contenttype/forms">
-  <Display>DocumentLibraryForm</Display>
-  <Edit>DocumentLibraryForm</Edit>
-  <New>DocumentLibraryForm</New>
-</FormTemplates>
+<p:properties xmlns:p="http://schemas.microsoft.com/office/2006/metadata/properties" xmlns:xsi="http://www.w3.org/2001/XMLSchema-instance" xmlns:pc="http://schemas.microsoft.com/office/infopath/2007/PartnerControls">
+  <documentManagement/>
+</p:properties>
 </file>
 
 <file path=customXml/item2.xml><?xml version="1.0" encoding="utf-8"?>
@@ -12191,15 +12544,25 @@
 </file>
 
 <file path=customXml/item3.xml><?xml version="1.0" encoding="utf-8"?>
-<p:properties xmlns:p="http://schemas.microsoft.com/office/2006/metadata/properties" xmlns:xsi="http://www.w3.org/2001/XMLSchema-instance" xmlns:pc="http://schemas.microsoft.com/office/infopath/2007/PartnerControls">
-  <documentManagement/>
-</p:properties>
+<?mso-contentType ?>
+<FormTemplates xmlns="http://schemas.microsoft.com/sharepoint/v3/contenttype/forms">
+  <Display>DocumentLibraryForm</Display>
+  <Edit>DocumentLibraryForm</Edit>
+  <New>DocumentLibraryForm</New>
+</FormTemplates>
 </file>
 
 <file path=customXml/itemProps1.xml><?xml version="1.0" encoding="utf-8"?>
-<ds:datastoreItem xmlns:ds="http://schemas.openxmlformats.org/officeDocument/2006/customXml" ds:itemID="{87FD8B20-B89A-4B23-9329-175195DD4D8A}">
+<ds:datastoreItem xmlns:ds="http://schemas.openxmlformats.org/officeDocument/2006/customXml" ds:itemID="{3473EA1A-2744-48E8-B2A3-4F89C0FC849C}">
   <ds:schemaRefs>
-    <ds:schemaRef ds:uri="http://schemas.microsoft.com/sharepoint/v3/contenttype/forms"/>
+    <ds:schemaRef ds:uri="http://purl.org/dc/terms/"/>
+    <ds:schemaRef ds:uri="http://schemas.openxmlformats.org/package/2006/metadata/core-properties"/>
+    <ds:schemaRef ds:uri="http://schemas.microsoft.com/office/2006/documentManagement/types"/>
+    <ds:schemaRef ds:uri="http://purl.org/dc/dcmitype/"/>
+    <ds:schemaRef ds:uri="http://schemas.microsoft.com/office/infopath/2007/PartnerControls"/>
+    <ds:schemaRef ds:uri="http://purl.org/dc/elements/1.1/"/>
+    <ds:schemaRef ds:uri="http://schemas.microsoft.com/office/2006/metadata/properties"/>
+    <ds:schemaRef ds:uri="http://www.w3.org/XML/1998/namespace"/>
   </ds:schemaRefs>
 </ds:datastoreItem>
 </file>
@@ -12221,16 +12584,9 @@
 </file>
 
 <file path=customXml/itemProps3.xml><?xml version="1.0" encoding="utf-8"?>
-<ds:datastoreItem xmlns:ds="http://schemas.openxmlformats.org/officeDocument/2006/customXml" ds:itemID="{3473EA1A-2744-48E8-B2A3-4F89C0FC849C}">
+<ds:datastoreItem xmlns:ds="http://schemas.openxmlformats.org/officeDocument/2006/customXml" ds:itemID="{87FD8B20-B89A-4B23-9329-175195DD4D8A}">
   <ds:schemaRefs>
-    <ds:schemaRef ds:uri="http://schemas.microsoft.com/office/2006/documentManagement/types"/>
-    <ds:schemaRef ds:uri="http://purl.org/dc/terms/"/>
-    <ds:schemaRef ds:uri="http://schemas.openxmlformats.org/package/2006/metadata/core-properties"/>
-    <ds:schemaRef ds:uri="http://purl.org/dc/dcmitype/"/>
-    <ds:schemaRef ds:uri="http://schemas.microsoft.com/office/infopath/2007/PartnerControls"/>
-    <ds:schemaRef ds:uri="http://purl.org/dc/elements/1.1/"/>
-    <ds:schemaRef ds:uri="http://schemas.microsoft.com/office/2006/metadata/properties"/>
-    <ds:schemaRef ds:uri="http://www.w3.org/XML/1998/namespace"/>
+    <ds:schemaRef ds:uri="http://schemas.microsoft.com/sharepoint/v3/contenttype/forms"/>
   </ds:schemaRefs>
 </ds:datastoreItem>
 </file>
</xml_diff>